<commit_message>
Adicao de PowerPoint Funcoes
</commit_message>
<xml_diff>
--- a/DBAJoin/calculos e funcoes.pptx
+++ b/DBAJoin/calculos e funcoes.pptx
@@ -5,7 +5,7 @@
     <p:sldMasterId id="2147483648" r:id="rId1"/>
   </p:sldMasterIdLst>
   <p:notesMasterIdLst>
-    <p:notesMasterId r:id="rId10"/>
+    <p:notesMasterId r:id="rId11"/>
   </p:notesMasterIdLst>
   <p:sldIdLst>
     <p:sldId id="256" r:id="rId2"/>
@@ -16,6 +16,7 @@
     <p:sldId id="260" r:id="rId7"/>
     <p:sldId id="263" r:id="rId8"/>
     <p:sldId id="259" r:id="rId9"/>
+    <p:sldId id="264" r:id="rId10"/>
   </p:sldIdLst>
   <p:sldSz cx="12192000" cy="6858000"/>
   <p:notesSz cx="7559675" cy="10691813"/>
@@ -264,7 +265,7 @@
       </p15:sldGuideLst>
     </p:ext>
     <p:ext uri="GoogleSlidesCustomDataVersion2">
-      <go:slidesCustomData xmlns:go="http://customooxmlschemas.google.com/" xmlns:ahyp="http://schemas.microsoft.com/office/drawing/2018/hyperlinkcolor" xmlns:p15="http://schemas.microsoft.com/office/powerpoint/2012/main" xmlns:p14="http://schemas.microsoft.com/office/powerpoint/2010/main" xmlns:com="http://schemas.openxmlformats.org/drawingml/2006/compatibility" xmlns:pvml="urn:schemas-microsoft-com:office:powerpoint" xmlns:v="urn:schemas-microsoft-com:vml" xmlns:o="urn:schemas-microsoft-com:office:office" xmlns:dgm="http://schemas.openxmlformats.org/drawingml/2006/diagram" xmlns:c="http://schemas.openxmlformats.org/drawingml/2006/chart" xmlns:mv="urn:schemas-microsoft-com:mac:vml" xmlns:mc="http://schemas.openxmlformats.org/markup-compatibility/2006" xmlns="" r:id="rId28" roundtripDataSignature="AMtx7mjq6/zVsTJh3A7WkKX9jTztccA4vg=="/>
+      <go:slidesCustomData xmlns="" xmlns:mc="http://schemas.openxmlformats.org/markup-compatibility/2006" xmlns:mv="urn:schemas-microsoft-com:mac:vml" xmlns:c="http://schemas.openxmlformats.org/drawingml/2006/chart" xmlns:dgm="http://schemas.openxmlformats.org/drawingml/2006/diagram" xmlns:o="urn:schemas-microsoft-com:office:office" xmlns:v="urn:schemas-microsoft-com:vml" xmlns:pvml="urn:schemas-microsoft-com:office:powerpoint" xmlns:com="http://schemas.openxmlformats.org/drawingml/2006/compatibility" xmlns:p14="http://schemas.microsoft.com/office/powerpoint/2010/main" xmlns:p15="http://schemas.microsoft.com/office/powerpoint/2012/main" xmlns:ahyp="http://schemas.microsoft.com/office/drawing/2018/hyperlinkcolor" xmlns:go="http://customooxmlschemas.google.com/" r:id="rId28" roundtripDataSignature="AMtx7mjq6/zVsTJh3A7WkKX9jTztccA4vg=="/>
     </p:ext>
   </p:extLst>
 </p:presentation>
@@ -917,6 +918,115 @@
         </p:spPr>
       </p:sp>
     </p:spTree>
+  </p:cSld>
+  <p:clrMapOvr>
+    <a:masterClrMapping/>
+  </p:clrMapOvr>
+</p:notes>
+</file>
+
+<file path=ppt/notesSlides/notesSlide3.xml><?xml version="1.0" encoding="utf-8"?>
+<p:notes xmlns:a="http://schemas.openxmlformats.org/drawingml/2006/main" xmlns:r="http://schemas.openxmlformats.org/officeDocument/2006/relationships" xmlns:p="http://schemas.openxmlformats.org/presentationml/2006/main" showMasterSp="0" showMasterPhAnim="0">
+  <p:cSld>
+    <p:spTree>
+      <p:nvGrpSpPr>
+        <p:cNvPr id="1" name="Shape 146"/>
+        <p:cNvGrpSpPr/>
+        <p:nvPr/>
+      </p:nvGrpSpPr>
+      <p:grpSpPr>
+        <a:xfrm>
+          <a:off x="0" y="0"/>
+          <a:ext cx="0" cy="0"/>
+          <a:chOff x="0" y="0"/>
+          <a:chExt cx="0" cy="0"/>
+        </a:xfrm>
+      </p:grpSpPr>
+      <p:sp>
+        <p:nvSpPr>
+          <p:cNvPr id="147" name="Google Shape;147;p1:notes"/>
+          <p:cNvSpPr txBox="1">
+            <a:spLocks noGrp="1"/>
+          </p:cNvSpPr>
+          <p:nvPr>
+            <p:ph type="body" idx="1"/>
+          </p:nvPr>
+        </p:nvSpPr>
+        <p:spPr>
+          <a:xfrm>
+            <a:off x="755950" y="5078600"/>
+            <a:ext cx="6047725" cy="4811300"/>
+          </a:xfrm>
+          <a:prstGeom prst="rect">
+            <a:avLst/>
+          </a:prstGeom>
+        </p:spPr>
+        <p:txBody>
+          <a:bodyPr spcFirstLastPara="1" wrap="square" lIns="91425" tIns="91425" rIns="91425" bIns="91425" anchor="t" anchorCtr="0">
+            <a:noAutofit/>
+          </a:bodyPr>
+          <a:lstStyle/>
+          <a:p>
+            <a:pPr marL="0" lvl="0" indent="0" algn="l" rtl="0">
+              <a:spcBef>
+                <a:spcPts val="0"/>
+              </a:spcBef>
+              <a:spcAft>
+                <a:spcPts val="0"/>
+              </a:spcAft>
+              <a:buNone/>
+            </a:pPr>
+            <a:endParaRPr dirty="0"/>
+          </a:p>
+        </p:txBody>
+      </p:sp>
+      <p:sp>
+        <p:nvSpPr>
+          <p:cNvPr id="148" name="Google Shape;148;p1:notes"/>
+          <p:cNvSpPr>
+            <a:spLocks noGrp="1" noRot="1" noChangeAspect="1"/>
+          </p:cNvSpPr>
+          <p:nvPr>
+            <p:ph type="sldImg" idx="2"/>
+          </p:nvPr>
+        </p:nvSpPr>
+        <p:spPr>
+          <a:xfrm>
+            <a:off x="217488" y="801688"/>
+            <a:ext cx="7126287" cy="4010025"/>
+          </a:xfrm>
+          <a:custGeom>
+            <a:avLst/>
+            <a:gdLst/>
+            <a:ahLst/>
+            <a:cxnLst/>
+            <a:rect l="l" t="t" r="r" b="b"/>
+            <a:pathLst>
+              <a:path w="120000" h="120000" extrusionOk="0">
+                <a:moveTo>
+                  <a:pt x="0" y="0"/>
+                </a:moveTo>
+                <a:lnTo>
+                  <a:pt x="120000" y="0"/>
+                </a:lnTo>
+                <a:lnTo>
+                  <a:pt x="120000" y="120000"/>
+                </a:lnTo>
+                <a:lnTo>
+                  <a:pt x="0" y="120000"/>
+                </a:lnTo>
+                <a:close/>
+              </a:path>
+            </a:pathLst>
+          </a:custGeom>
+        </p:spPr>
+      </p:sp>
+    </p:spTree>
+    <p:extLst>
+      <p:ext uri="{BB962C8B-B14F-4D97-AF65-F5344CB8AC3E}">
+        <p14:creationId xmlns:p14="http://schemas.microsoft.com/office/powerpoint/2010/main" val="2317688510"/>
+      </p:ext>
+    </p:extLst>
   </p:cSld>
   <p:clrMapOvr>
     <a:masterClrMapping/>
@@ -7582,6 +7692,91 @@
 </p:sld>
 </file>
 
+<file path=ppt/slides/slide9.xml><?xml version="1.0" encoding="utf-8"?>
+<p:sld xmlns:a="http://schemas.openxmlformats.org/drawingml/2006/main" xmlns:r="http://schemas.openxmlformats.org/officeDocument/2006/relationships" xmlns:p="http://schemas.openxmlformats.org/presentationml/2006/main">
+  <p:cSld>
+    <p:spTree>
+      <p:nvGrpSpPr>
+        <p:cNvPr id="1" name="Shape 149"/>
+        <p:cNvGrpSpPr/>
+        <p:nvPr/>
+      </p:nvGrpSpPr>
+      <p:grpSpPr>
+        <a:xfrm>
+          <a:off x="0" y="0"/>
+          <a:ext cx="0" cy="0"/>
+          <a:chOff x="0" y="0"/>
+          <a:chExt cx="0" cy="0"/>
+        </a:xfrm>
+      </p:grpSpPr>
+      <p:sp>
+        <p:nvSpPr>
+          <p:cNvPr id="2" name="CaixaDeTexto 1">
+            <a:extLst>
+              <a:ext uri="{FF2B5EF4-FFF2-40B4-BE49-F238E27FC236}">
+                <a16:creationId xmlns:a16="http://schemas.microsoft.com/office/drawing/2014/main" id="{DF252248-2861-429D-98AD-83F75A998305}"/>
+              </a:ext>
+            </a:extLst>
+          </p:cNvPr>
+          <p:cNvSpPr txBox="1"/>
+          <p:nvPr/>
+        </p:nvSpPr>
+        <p:spPr>
+          <a:xfrm>
+            <a:off x="2855640" y="2564904"/>
+            <a:ext cx="8820980" cy="1569660"/>
+          </a:xfrm>
+          <a:prstGeom prst="rect">
+            <a:avLst/>
+          </a:prstGeom>
+          <a:noFill/>
+        </p:spPr>
+        <p:txBody>
+          <a:bodyPr wrap="square" rtlCol="0">
+            <a:spAutoFit/>
+          </a:bodyPr>
+          <a:lstStyle/>
+          <a:p>
+            <a:r>
+              <a:rPr lang="pt-BR" sz="2400" b="1" dirty="0"/>
+              <a:t>DATEDIFF() - </a:t>
+            </a:r>
+            <a:r>
+              <a:rPr lang="pt-BR" sz="2400" dirty="0"/>
+              <a:t>RETORNA A QUANTIDADE DE DIAS ENTRE DUAS DATAS</a:t>
+            </a:r>
+          </a:p>
+          <a:p>
+            <a:r>
+              <a:rPr lang="pt-BR" sz="2400" b="1" dirty="0"/>
+              <a:t>DATE_ADD() - </a:t>
+            </a:r>
+            <a:r>
+              <a:rPr lang="pt-BR" sz="2400" dirty="0"/>
+              <a:t>ADICIONA</a:t>
+            </a:r>
+          </a:p>
+          <a:p>
+            <a:r>
+              <a:rPr lang="pt-BR" sz="2400" b="1" dirty="0"/>
+              <a:t>DATE_SUB() -</a:t>
+            </a:r>
+          </a:p>
+        </p:txBody>
+      </p:sp>
+    </p:spTree>
+    <p:extLst>
+      <p:ext uri="{BB962C8B-B14F-4D97-AF65-F5344CB8AC3E}">
+        <p14:creationId xmlns:p14="http://schemas.microsoft.com/office/powerpoint/2010/main" val="1706198375"/>
+      </p:ext>
+    </p:extLst>
+  </p:cSld>
+  <p:clrMapOvr>
+    <a:masterClrMapping/>
+  </p:clrMapOvr>
+</p:sld>
+</file>
+
 <file path=ppt/theme/theme1.xml><?xml version="1.0" encoding="utf-8"?>
 <a:theme xmlns:a="http://schemas.openxmlformats.org/drawingml/2006/main" name="Office Theme">
   <a:themeElements>

</xml_diff>